<commit_message>
make pdf introduce file
</commit_message>
<xml_diff>
--- a/MobileX-CCTV.pptx
+++ b/MobileX-CCTV.pptx
@@ -14,7 +14,8 @@
     <p:sldId id="260" r:id="rId8"/>
     <p:sldId id="262" r:id="rId9"/>
     <p:sldId id="264" r:id="rId10"/>
-    <p:sldId id="265" r:id="rId11"/>
+    <p:sldId id="266" r:id="rId11"/>
+    <p:sldId id="265" r:id="rId12"/>
   </p:sldIdLst>
   <p:sldSz cx="12192000" cy="6858000"/>
   <p:notesSz cx="6858000" cy="9144000"/>
@@ -268,7 +269,7 @@
           <a:p>
             <a:fld id="{73A2C71B-BE81-714C-B7C9-9A0AF84B54D4}" type="datetimeFigureOut">
               <a:rPr kumimoji="1" lang="ko-KR" altLang="en-US" smtClean="0"/>
-              <a:t>2024. 1. 19.</a:t>
+              <a:t>2024. 3. 4.</a:t>
             </a:fld>
             <a:endParaRPr kumimoji="1" lang="ko-KR" altLang="en-US"/>
           </a:p>
@@ -466,7 +467,7 @@
           <a:p>
             <a:fld id="{73A2C71B-BE81-714C-B7C9-9A0AF84B54D4}" type="datetimeFigureOut">
               <a:rPr kumimoji="1" lang="ko-KR" altLang="en-US" smtClean="0"/>
-              <a:t>2024. 1. 19.</a:t>
+              <a:t>2024. 3. 4.</a:t>
             </a:fld>
             <a:endParaRPr kumimoji="1" lang="ko-KR" altLang="en-US"/>
           </a:p>
@@ -674,7 +675,7 @@
           <a:p>
             <a:fld id="{73A2C71B-BE81-714C-B7C9-9A0AF84B54D4}" type="datetimeFigureOut">
               <a:rPr kumimoji="1" lang="ko-KR" altLang="en-US" smtClean="0"/>
-              <a:t>2024. 1. 19.</a:t>
+              <a:t>2024. 3. 4.</a:t>
             </a:fld>
             <a:endParaRPr kumimoji="1" lang="ko-KR" altLang="en-US"/>
           </a:p>
@@ -872,7 +873,7 @@
           <a:p>
             <a:fld id="{73A2C71B-BE81-714C-B7C9-9A0AF84B54D4}" type="datetimeFigureOut">
               <a:rPr kumimoji="1" lang="ko-KR" altLang="en-US" smtClean="0"/>
-              <a:t>2024. 1. 19.</a:t>
+              <a:t>2024. 3. 4.</a:t>
             </a:fld>
             <a:endParaRPr kumimoji="1" lang="ko-KR" altLang="en-US"/>
           </a:p>
@@ -1147,7 +1148,7 @@
           <a:p>
             <a:fld id="{73A2C71B-BE81-714C-B7C9-9A0AF84B54D4}" type="datetimeFigureOut">
               <a:rPr kumimoji="1" lang="ko-KR" altLang="en-US" smtClean="0"/>
-              <a:t>2024. 1. 19.</a:t>
+              <a:t>2024. 3. 4.</a:t>
             </a:fld>
             <a:endParaRPr kumimoji="1" lang="ko-KR" altLang="en-US"/>
           </a:p>
@@ -1412,7 +1413,7 @@
           <a:p>
             <a:fld id="{73A2C71B-BE81-714C-B7C9-9A0AF84B54D4}" type="datetimeFigureOut">
               <a:rPr kumimoji="1" lang="ko-KR" altLang="en-US" smtClean="0"/>
-              <a:t>2024. 1. 19.</a:t>
+              <a:t>2024. 3. 4.</a:t>
             </a:fld>
             <a:endParaRPr kumimoji="1" lang="ko-KR" altLang="en-US"/>
           </a:p>
@@ -1824,7 +1825,7 @@
           <a:p>
             <a:fld id="{73A2C71B-BE81-714C-B7C9-9A0AF84B54D4}" type="datetimeFigureOut">
               <a:rPr kumimoji="1" lang="ko-KR" altLang="en-US" smtClean="0"/>
-              <a:t>2024. 1. 19.</a:t>
+              <a:t>2024. 3. 4.</a:t>
             </a:fld>
             <a:endParaRPr kumimoji="1" lang="ko-KR" altLang="en-US"/>
           </a:p>
@@ -1965,7 +1966,7 @@
           <a:p>
             <a:fld id="{73A2C71B-BE81-714C-B7C9-9A0AF84B54D4}" type="datetimeFigureOut">
               <a:rPr kumimoji="1" lang="ko-KR" altLang="en-US" smtClean="0"/>
-              <a:t>2024. 1. 19.</a:t>
+              <a:t>2024. 3. 4.</a:t>
             </a:fld>
             <a:endParaRPr kumimoji="1" lang="ko-KR" altLang="en-US"/>
           </a:p>
@@ -2078,7 +2079,7 @@
           <a:p>
             <a:fld id="{73A2C71B-BE81-714C-B7C9-9A0AF84B54D4}" type="datetimeFigureOut">
               <a:rPr kumimoji="1" lang="ko-KR" altLang="en-US" smtClean="0"/>
-              <a:t>2024. 1. 19.</a:t>
+              <a:t>2024. 3. 4.</a:t>
             </a:fld>
             <a:endParaRPr kumimoji="1" lang="ko-KR" altLang="en-US"/>
           </a:p>
@@ -2389,7 +2390,7 @@
           <a:p>
             <a:fld id="{73A2C71B-BE81-714C-B7C9-9A0AF84B54D4}" type="datetimeFigureOut">
               <a:rPr kumimoji="1" lang="ko-KR" altLang="en-US" smtClean="0"/>
-              <a:t>2024. 1. 19.</a:t>
+              <a:t>2024. 3. 4.</a:t>
             </a:fld>
             <a:endParaRPr kumimoji="1" lang="ko-KR" altLang="en-US"/>
           </a:p>
@@ -2677,7 +2678,7 @@
           <a:p>
             <a:fld id="{73A2C71B-BE81-714C-B7C9-9A0AF84B54D4}" type="datetimeFigureOut">
               <a:rPr kumimoji="1" lang="ko-KR" altLang="en-US" smtClean="0"/>
-              <a:t>2024. 1. 19.</a:t>
+              <a:t>2024. 3. 4.</a:t>
             </a:fld>
             <a:endParaRPr kumimoji="1" lang="ko-KR" altLang="en-US"/>
           </a:p>
@@ -2918,7 +2919,7 @@
           <a:p>
             <a:fld id="{73A2C71B-BE81-714C-B7C9-9A0AF84B54D4}" type="datetimeFigureOut">
               <a:rPr kumimoji="1" lang="ko-KR" altLang="en-US" smtClean="0"/>
-              <a:t>2024. 1. 19.</a:t>
+              <a:t>2024. 3. 4.</a:t>
             </a:fld>
             <a:endParaRPr kumimoji="1" lang="ko-KR" altLang="en-US"/>
           </a:p>
@@ -3428,6 +3429,2076 @@
   <p:cSld>
     <p:spTree>
       <p:nvGrpSpPr>
+        <p:cNvPr id="1" name="">
+          <a:extLst>
+            <a:ext uri="{FF2B5EF4-FFF2-40B4-BE49-F238E27FC236}">
+              <a16:creationId xmlns:a16="http://schemas.microsoft.com/office/drawing/2014/main" id="{E91A8E56-CEA4-9745-7140-7081D20D97C6}"/>
+            </a:ext>
+          </a:extLst>
+        </p:cNvPr>
+        <p:cNvGrpSpPr/>
+        <p:nvPr/>
+      </p:nvGrpSpPr>
+      <p:grpSpPr>
+        <a:xfrm>
+          <a:off x="0" y="0"/>
+          <a:ext cx="0" cy="0"/>
+          <a:chOff x="0" y="0"/>
+          <a:chExt cx="0" cy="0"/>
+        </a:xfrm>
+      </p:grpSpPr>
+      <p:pic>
+        <p:nvPicPr>
+          <p:cNvPr id="5" name="그래픽 4" descr="컴퓨터 윤곽선">
+            <a:extLst>
+              <a:ext uri="{FF2B5EF4-FFF2-40B4-BE49-F238E27FC236}">
+                <a16:creationId xmlns:a16="http://schemas.microsoft.com/office/drawing/2014/main" id="{FBE53B5A-5094-8780-E71D-5ECA3B472D10}"/>
+              </a:ext>
+            </a:extLst>
+          </p:cNvPr>
+          <p:cNvPicPr>
+            <a:picLocks noChangeAspect="1"/>
+          </p:cNvPicPr>
+          <p:nvPr/>
+        </p:nvPicPr>
+        <p:blipFill>
+          <a:blip r:embed="rId2">
+            <a:extLst>
+              <a:ext uri="{96DAC541-7B7A-43D3-8B79-37D633B846F1}">
+                <asvg:svgBlip xmlns:asvg="http://schemas.microsoft.com/office/drawing/2016/SVG/main" r:embed="rId3"/>
+              </a:ext>
+            </a:extLst>
+          </a:blip>
+          <a:stretch>
+            <a:fillRect/>
+          </a:stretch>
+        </p:blipFill>
+        <p:spPr>
+          <a:xfrm>
+            <a:off x="1224713" y="3061215"/>
+            <a:ext cx="625030" cy="625030"/>
+          </a:xfrm>
+          <a:prstGeom prst="rect">
+            <a:avLst/>
+          </a:prstGeom>
+        </p:spPr>
+      </p:pic>
+      <p:pic>
+        <p:nvPicPr>
+          <p:cNvPr id="9" name="그래픽 8" descr="컴퓨터 윤곽선">
+            <a:extLst>
+              <a:ext uri="{FF2B5EF4-FFF2-40B4-BE49-F238E27FC236}">
+                <a16:creationId xmlns:a16="http://schemas.microsoft.com/office/drawing/2014/main" id="{83689538-7A05-A311-216A-D500F5C3D19A}"/>
+              </a:ext>
+            </a:extLst>
+          </p:cNvPr>
+          <p:cNvPicPr>
+            <a:picLocks noChangeAspect="1"/>
+          </p:cNvPicPr>
+          <p:nvPr/>
+        </p:nvPicPr>
+        <p:blipFill>
+          <a:blip r:embed="rId2">
+            <a:extLst>
+              <a:ext uri="{96DAC541-7B7A-43D3-8B79-37D633B846F1}">
+                <asvg:svgBlip xmlns:asvg="http://schemas.microsoft.com/office/drawing/2016/SVG/main" r:embed="rId3"/>
+              </a:ext>
+            </a:extLst>
+          </a:blip>
+          <a:stretch>
+            <a:fillRect/>
+          </a:stretch>
+        </p:blipFill>
+        <p:spPr>
+          <a:xfrm>
+            <a:off x="1224713" y="2436185"/>
+            <a:ext cx="625030" cy="625030"/>
+          </a:xfrm>
+          <a:prstGeom prst="rect">
+            <a:avLst/>
+          </a:prstGeom>
+        </p:spPr>
+      </p:pic>
+      <p:pic>
+        <p:nvPicPr>
+          <p:cNvPr id="10" name="그래픽 9" descr="컴퓨터 윤곽선">
+            <a:extLst>
+              <a:ext uri="{FF2B5EF4-FFF2-40B4-BE49-F238E27FC236}">
+                <a16:creationId xmlns:a16="http://schemas.microsoft.com/office/drawing/2014/main" id="{EF745685-1609-2BDA-D91B-7447C6ADD07E}"/>
+              </a:ext>
+            </a:extLst>
+          </p:cNvPr>
+          <p:cNvPicPr>
+            <a:picLocks noChangeAspect="1"/>
+          </p:cNvPicPr>
+          <p:nvPr/>
+        </p:nvPicPr>
+        <p:blipFill>
+          <a:blip r:embed="rId2">
+            <a:extLst>
+              <a:ext uri="{96DAC541-7B7A-43D3-8B79-37D633B846F1}">
+                <asvg:svgBlip xmlns:asvg="http://schemas.microsoft.com/office/drawing/2016/SVG/main" r:embed="rId3"/>
+              </a:ext>
+            </a:extLst>
+          </a:blip>
+          <a:stretch>
+            <a:fillRect/>
+          </a:stretch>
+        </p:blipFill>
+        <p:spPr>
+          <a:xfrm>
+            <a:off x="1241881" y="1811155"/>
+            <a:ext cx="625030" cy="625030"/>
+          </a:xfrm>
+          <a:prstGeom prst="rect">
+            <a:avLst/>
+          </a:prstGeom>
+        </p:spPr>
+      </p:pic>
+      <p:pic>
+        <p:nvPicPr>
+          <p:cNvPr id="12" name="그래픽 11" descr="컴퓨터 윤곽선">
+            <a:extLst>
+              <a:ext uri="{FF2B5EF4-FFF2-40B4-BE49-F238E27FC236}">
+                <a16:creationId xmlns:a16="http://schemas.microsoft.com/office/drawing/2014/main" id="{B8E68386-2D2C-1553-E179-1C19F193812D}"/>
+              </a:ext>
+            </a:extLst>
+          </p:cNvPr>
+          <p:cNvPicPr>
+            <a:picLocks noChangeAspect="1"/>
+          </p:cNvPicPr>
+          <p:nvPr/>
+        </p:nvPicPr>
+        <p:blipFill>
+          <a:blip r:embed="rId2">
+            <a:extLst>
+              <a:ext uri="{96DAC541-7B7A-43D3-8B79-37D633B846F1}">
+                <asvg:svgBlip xmlns:asvg="http://schemas.microsoft.com/office/drawing/2016/SVG/main" r:embed="rId3"/>
+              </a:ext>
+            </a:extLst>
+          </a:blip>
+          <a:stretch>
+            <a:fillRect/>
+          </a:stretch>
+        </p:blipFill>
+        <p:spPr>
+          <a:xfrm>
+            <a:off x="1224713" y="3686245"/>
+            <a:ext cx="625030" cy="625030"/>
+          </a:xfrm>
+          <a:prstGeom prst="rect">
+            <a:avLst/>
+          </a:prstGeom>
+        </p:spPr>
+      </p:pic>
+      <p:sp>
+        <p:nvSpPr>
+          <p:cNvPr id="13" name="직사각형 12">
+            <a:extLst>
+              <a:ext uri="{FF2B5EF4-FFF2-40B4-BE49-F238E27FC236}">
+                <a16:creationId xmlns:a16="http://schemas.microsoft.com/office/drawing/2014/main" id="{EA3935B2-79AE-B27D-B9D7-B2526254D95E}"/>
+              </a:ext>
+            </a:extLst>
+          </p:cNvPr>
+          <p:cNvSpPr/>
+          <p:nvPr/>
+        </p:nvSpPr>
+        <p:spPr>
+          <a:xfrm>
+            <a:off x="4512275" y="1909809"/>
+            <a:ext cx="1504257" cy="455634"/>
+          </a:xfrm>
+          <a:prstGeom prst="rect">
+            <a:avLst/>
+          </a:prstGeom>
+          <a:ln>
+            <a:solidFill>
+              <a:schemeClr val="tx1"/>
+            </a:solidFill>
+          </a:ln>
+        </p:spPr>
+        <p:style>
+          <a:lnRef idx="2">
+            <a:schemeClr val="accent6"/>
+          </a:lnRef>
+          <a:fillRef idx="1">
+            <a:schemeClr val="lt1"/>
+          </a:fillRef>
+          <a:effectRef idx="0">
+            <a:schemeClr val="accent6"/>
+          </a:effectRef>
+          <a:fontRef idx="minor">
+            <a:schemeClr val="dk1"/>
+          </a:fontRef>
+        </p:style>
+        <p:txBody>
+          <a:bodyPr rtlCol="0" anchor="ctr"/>
+          <a:lstStyle/>
+          <a:p>
+            <a:pPr algn="ctr"/>
+            <a:r>
+              <a:rPr kumimoji="1" lang="en-US" altLang="ko-KR" dirty="0"/>
+              <a:t>Server container</a:t>
+            </a:r>
+            <a:endParaRPr kumimoji="1" lang="ko-KR" altLang="en-US" dirty="0"/>
+          </a:p>
+        </p:txBody>
+      </p:sp>
+      <p:sp>
+        <p:nvSpPr>
+          <p:cNvPr id="17" name="직사각형 16">
+            <a:extLst>
+              <a:ext uri="{FF2B5EF4-FFF2-40B4-BE49-F238E27FC236}">
+                <a16:creationId xmlns:a16="http://schemas.microsoft.com/office/drawing/2014/main" id="{F408AA9B-97AC-7409-8F07-51DB6781256F}"/>
+              </a:ext>
+            </a:extLst>
+          </p:cNvPr>
+          <p:cNvSpPr/>
+          <p:nvPr/>
+        </p:nvSpPr>
+        <p:spPr>
+          <a:xfrm>
+            <a:off x="4512275" y="2509792"/>
+            <a:ext cx="1504257" cy="455634"/>
+          </a:xfrm>
+          <a:prstGeom prst="rect">
+            <a:avLst/>
+          </a:prstGeom>
+          <a:ln>
+            <a:solidFill>
+              <a:schemeClr val="tx1"/>
+            </a:solidFill>
+          </a:ln>
+        </p:spPr>
+        <p:style>
+          <a:lnRef idx="2">
+            <a:schemeClr val="accent6"/>
+          </a:lnRef>
+          <a:fillRef idx="1">
+            <a:schemeClr val="lt1"/>
+          </a:fillRef>
+          <a:effectRef idx="0">
+            <a:schemeClr val="accent6"/>
+          </a:effectRef>
+          <a:fontRef idx="minor">
+            <a:schemeClr val="dk1"/>
+          </a:fontRef>
+        </p:style>
+        <p:txBody>
+          <a:bodyPr rtlCol="0" anchor="ctr"/>
+          <a:lstStyle/>
+          <a:p>
+            <a:pPr algn="ctr"/>
+            <a:r>
+              <a:rPr kumimoji="1" lang="en-US" altLang="ko-KR" dirty="0"/>
+              <a:t>Server container</a:t>
+            </a:r>
+            <a:endParaRPr kumimoji="1" lang="ko-KR" altLang="en-US" dirty="0"/>
+          </a:p>
+        </p:txBody>
+      </p:sp>
+      <p:sp>
+        <p:nvSpPr>
+          <p:cNvPr id="18" name="직사각형 17">
+            <a:extLst>
+              <a:ext uri="{FF2B5EF4-FFF2-40B4-BE49-F238E27FC236}">
+                <a16:creationId xmlns:a16="http://schemas.microsoft.com/office/drawing/2014/main" id="{6485A68B-844B-9995-9DDC-830D28053702}"/>
+              </a:ext>
+            </a:extLst>
+          </p:cNvPr>
+          <p:cNvSpPr/>
+          <p:nvPr/>
+        </p:nvSpPr>
+        <p:spPr>
+          <a:xfrm>
+            <a:off x="4512275" y="3084728"/>
+            <a:ext cx="1504257" cy="455634"/>
+          </a:xfrm>
+          <a:prstGeom prst="rect">
+            <a:avLst/>
+          </a:prstGeom>
+          <a:ln>
+            <a:solidFill>
+              <a:schemeClr val="tx1"/>
+            </a:solidFill>
+          </a:ln>
+        </p:spPr>
+        <p:style>
+          <a:lnRef idx="2">
+            <a:schemeClr val="accent6"/>
+          </a:lnRef>
+          <a:fillRef idx="1">
+            <a:schemeClr val="lt1"/>
+          </a:fillRef>
+          <a:effectRef idx="0">
+            <a:schemeClr val="accent6"/>
+          </a:effectRef>
+          <a:fontRef idx="minor">
+            <a:schemeClr val="dk1"/>
+          </a:fontRef>
+        </p:style>
+        <p:txBody>
+          <a:bodyPr rtlCol="0" anchor="ctr"/>
+          <a:lstStyle/>
+          <a:p>
+            <a:pPr algn="ctr"/>
+            <a:r>
+              <a:rPr kumimoji="1" lang="en-US" altLang="ko-KR" dirty="0"/>
+              <a:t>Server container</a:t>
+            </a:r>
+            <a:endParaRPr kumimoji="1" lang="ko-KR" altLang="en-US" dirty="0"/>
+          </a:p>
+        </p:txBody>
+      </p:sp>
+      <p:sp>
+        <p:nvSpPr>
+          <p:cNvPr id="19" name="오른쪽 화살표[R] 18">
+            <a:extLst>
+              <a:ext uri="{FF2B5EF4-FFF2-40B4-BE49-F238E27FC236}">
+                <a16:creationId xmlns:a16="http://schemas.microsoft.com/office/drawing/2014/main" id="{542A5F08-84A6-6275-2F01-29B9C97B28B9}"/>
+              </a:ext>
+            </a:extLst>
+          </p:cNvPr>
+          <p:cNvSpPr/>
+          <p:nvPr/>
+        </p:nvSpPr>
+        <p:spPr>
+          <a:xfrm>
+            <a:off x="2217682" y="2362250"/>
+            <a:ext cx="1303283" cy="793196"/>
+          </a:xfrm>
+          <a:prstGeom prst="rightArrow">
+            <a:avLst/>
+          </a:prstGeom>
+          <a:solidFill>
+            <a:schemeClr val="bg1"/>
+          </a:solidFill>
+        </p:spPr>
+        <p:style>
+          <a:lnRef idx="2">
+            <a:schemeClr val="accent1">
+              <a:shade val="15000"/>
+            </a:schemeClr>
+          </a:lnRef>
+          <a:fillRef idx="1">
+            <a:schemeClr val="accent1"/>
+          </a:fillRef>
+          <a:effectRef idx="0">
+            <a:schemeClr val="accent1"/>
+          </a:effectRef>
+          <a:fontRef idx="minor">
+            <a:schemeClr val="lt1"/>
+          </a:fontRef>
+        </p:style>
+        <p:txBody>
+          <a:bodyPr rtlCol="0" anchor="ctr"/>
+          <a:lstStyle/>
+          <a:p>
+            <a:pPr algn="ctr"/>
+            <a:r>
+              <a:rPr kumimoji="1" lang="en-US" altLang="ko-KR" dirty="0">
+                <a:solidFill>
+                  <a:schemeClr val="tx1"/>
+                </a:solidFill>
+              </a:rPr>
+              <a:t>Index</a:t>
+            </a:r>
+            <a:endParaRPr kumimoji="1" lang="ko-KR" altLang="en-US" dirty="0">
+              <a:solidFill>
+                <a:schemeClr val="tx1"/>
+              </a:solidFill>
+            </a:endParaRPr>
+          </a:p>
+        </p:txBody>
+      </p:sp>
+      <p:sp>
+        <p:nvSpPr>
+          <p:cNvPr id="20" name="직사각형 19">
+            <a:extLst>
+              <a:ext uri="{FF2B5EF4-FFF2-40B4-BE49-F238E27FC236}">
+                <a16:creationId xmlns:a16="http://schemas.microsoft.com/office/drawing/2014/main" id="{DC406751-AFF0-AD7E-0250-F8277BCF728A}"/>
+              </a:ext>
+            </a:extLst>
+          </p:cNvPr>
+          <p:cNvSpPr/>
+          <p:nvPr/>
+        </p:nvSpPr>
+        <p:spPr>
+          <a:xfrm>
+            <a:off x="3573514" y="1671144"/>
+            <a:ext cx="886207" cy="2147125"/>
+          </a:xfrm>
+          <a:prstGeom prst="rect">
+            <a:avLst/>
+          </a:prstGeom>
+          <a:ln>
+            <a:solidFill>
+              <a:schemeClr val="tx1"/>
+            </a:solidFill>
+          </a:ln>
+        </p:spPr>
+        <p:style>
+          <a:lnRef idx="2">
+            <a:schemeClr val="accent6"/>
+          </a:lnRef>
+          <a:fillRef idx="1">
+            <a:schemeClr val="lt1"/>
+          </a:fillRef>
+          <a:effectRef idx="0">
+            <a:schemeClr val="accent6"/>
+          </a:effectRef>
+          <a:fontRef idx="minor">
+            <a:schemeClr val="dk1"/>
+          </a:fontRef>
+        </p:style>
+        <p:txBody>
+          <a:bodyPr rtlCol="0" anchor="ctr"/>
+          <a:lstStyle/>
+          <a:p>
+            <a:pPr algn="ctr"/>
+            <a:r>
+              <a:rPr kumimoji="1" lang="en-US" altLang="ko-KR" dirty="0"/>
+              <a:t>Queue</a:t>
+            </a:r>
+            <a:endParaRPr kumimoji="1" lang="ko-KR" altLang="en-US" dirty="0"/>
+          </a:p>
+        </p:txBody>
+      </p:sp>
+      <p:pic>
+        <p:nvPicPr>
+          <p:cNvPr id="27" name="그림 26" descr="폰트, 그래픽, 로고, 스크린샷이(가) 표시된 사진&#10;&#10;자동 생성된 설명">
+            <a:extLst>
+              <a:ext uri="{FF2B5EF4-FFF2-40B4-BE49-F238E27FC236}">
+                <a16:creationId xmlns:a16="http://schemas.microsoft.com/office/drawing/2014/main" id="{B9C12F49-ECE5-3B15-9DB5-F741049BBBA5}"/>
+              </a:ext>
+            </a:extLst>
+          </p:cNvPr>
+          <p:cNvPicPr>
+            <a:picLocks noChangeAspect="1"/>
+          </p:cNvPicPr>
+          <p:nvPr/>
+        </p:nvPicPr>
+        <p:blipFill>
+          <a:blip r:embed="rId4"/>
+          <a:stretch>
+            <a:fillRect/>
+          </a:stretch>
+        </p:blipFill>
+        <p:spPr>
+          <a:xfrm>
+            <a:off x="2207171" y="1964507"/>
+            <a:ext cx="1278961" cy="346238"/>
+          </a:xfrm>
+          <a:prstGeom prst="rect">
+            <a:avLst/>
+          </a:prstGeom>
+        </p:spPr>
+      </p:pic>
+      <p:pic>
+        <p:nvPicPr>
+          <p:cNvPr id="29" name="그래픽 28" descr="컴퓨터 윤곽선">
+            <a:extLst>
+              <a:ext uri="{FF2B5EF4-FFF2-40B4-BE49-F238E27FC236}">
+                <a16:creationId xmlns:a16="http://schemas.microsoft.com/office/drawing/2014/main" id="{81B60FD3-255B-F420-1969-2C6087CC7067}"/>
+              </a:ext>
+            </a:extLst>
+          </p:cNvPr>
+          <p:cNvPicPr>
+            <a:picLocks noChangeAspect="1"/>
+          </p:cNvPicPr>
+          <p:nvPr/>
+        </p:nvPicPr>
+        <p:blipFill>
+          <a:blip r:embed="rId2">
+            <a:extLst>
+              <a:ext uri="{96DAC541-7B7A-43D3-8B79-37D633B846F1}">
+                <asvg:svgBlip xmlns:asvg="http://schemas.microsoft.com/office/drawing/2016/SVG/main" r:embed="rId3"/>
+              </a:ext>
+            </a:extLst>
+          </a:blip>
+          <a:stretch>
+            <a:fillRect/>
+          </a:stretch>
+        </p:blipFill>
+        <p:spPr>
+          <a:xfrm>
+            <a:off x="1224635" y="5561335"/>
+            <a:ext cx="625030" cy="625030"/>
+          </a:xfrm>
+          <a:prstGeom prst="rect">
+            <a:avLst/>
+          </a:prstGeom>
+        </p:spPr>
+      </p:pic>
+      <p:pic>
+        <p:nvPicPr>
+          <p:cNvPr id="30" name="그래픽 29" descr="컴퓨터 윤곽선">
+            <a:extLst>
+              <a:ext uri="{FF2B5EF4-FFF2-40B4-BE49-F238E27FC236}">
+                <a16:creationId xmlns:a16="http://schemas.microsoft.com/office/drawing/2014/main" id="{947FE571-CCE6-2481-44B9-6A8524DCDCF4}"/>
+              </a:ext>
+            </a:extLst>
+          </p:cNvPr>
+          <p:cNvPicPr>
+            <a:picLocks noChangeAspect="1"/>
+          </p:cNvPicPr>
+          <p:nvPr/>
+        </p:nvPicPr>
+        <p:blipFill>
+          <a:blip r:embed="rId2">
+            <a:extLst>
+              <a:ext uri="{96DAC541-7B7A-43D3-8B79-37D633B846F1}">
+                <asvg:svgBlip xmlns:asvg="http://schemas.microsoft.com/office/drawing/2016/SVG/main" r:embed="rId3"/>
+              </a:ext>
+            </a:extLst>
+          </a:blip>
+          <a:stretch>
+            <a:fillRect/>
+          </a:stretch>
+        </p:blipFill>
+        <p:spPr>
+          <a:xfrm>
+            <a:off x="1224635" y="4936305"/>
+            <a:ext cx="625030" cy="625030"/>
+          </a:xfrm>
+          <a:prstGeom prst="rect">
+            <a:avLst/>
+          </a:prstGeom>
+        </p:spPr>
+      </p:pic>
+      <p:pic>
+        <p:nvPicPr>
+          <p:cNvPr id="31" name="그래픽 30" descr="컴퓨터 윤곽선">
+            <a:extLst>
+              <a:ext uri="{FF2B5EF4-FFF2-40B4-BE49-F238E27FC236}">
+                <a16:creationId xmlns:a16="http://schemas.microsoft.com/office/drawing/2014/main" id="{1B4728A4-67EE-2463-B99C-6A3CE05EEC51}"/>
+              </a:ext>
+            </a:extLst>
+          </p:cNvPr>
+          <p:cNvPicPr>
+            <a:picLocks noChangeAspect="1"/>
+          </p:cNvPicPr>
+          <p:nvPr/>
+        </p:nvPicPr>
+        <p:blipFill>
+          <a:blip r:embed="rId2">
+            <a:extLst>
+              <a:ext uri="{96DAC541-7B7A-43D3-8B79-37D633B846F1}">
+                <asvg:svgBlip xmlns:asvg="http://schemas.microsoft.com/office/drawing/2016/SVG/main" r:embed="rId3"/>
+              </a:ext>
+            </a:extLst>
+          </a:blip>
+          <a:stretch>
+            <a:fillRect/>
+          </a:stretch>
+        </p:blipFill>
+        <p:spPr>
+          <a:xfrm>
+            <a:off x="1241803" y="4311275"/>
+            <a:ext cx="625030" cy="625030"/>
+          </a:xfrm>
+          <a:prstGeom prst="rect">
+            <a:avLst/>
+          </a:prstGeom>
+        </p:spPr>
+      </p:pic>
+      <p:pic>
+        <p:nvPicPr>
+          <p:cNvPr id="32" name="그래픽 31" descr="컴퓨터 윤곽선">
+            <a:extLst>
+              <a:ext uri="{FF2B5EF4-FFF2-40B4-BE49-F238E27FC236}">
+                <a16:creationId xmlns:a16="http://schemas.microsoft.com/office/drawing/2014/main" id="{0CD10D8F-7074-B07C-0001-4DBAC1328420}"/>
+              </a:ext>
+            </a:extLst>
+          </p:cNvPr>
+          <p:cNvPicPr>
+            <a:picLocks noChangeAspect="1"/>
+          </p:cNvPicPr>
+          <p:nvPr/>
+        </p:nvPicPr>
+        <p:blipFill>
+          <a:blip r:embed="rId2">
+            <a:extLst>
+              <a:ext uri="{96DAC541-7B7A-43D3-8B79-37D633B846F1}">
+                <asvg:svgBlip xmlns:asvg="http://schemas.microsoft.com/office/drawing/2016/SVG/main" r:embed="rId3"/>
+              </a:ext>
+            </a:extLst>
+          </a:blip>
+          <a:stretch>
+            <a:fillRect/>
+          </a:stretch>
+        </p:blipFill>
+        <p:spPr>
+          <a:xfrm>
+            <a:off x="1224635" y="6186365"/>
+            <a:ext cx="625030" cy="625030"/>
+          </a:xfrm>
+          <a:prstGeom prst="rect">
+            <a:avLst/>
+          </a:prstGeom>
+        </p:spPr>
+      </p:pic>
+      <p:sp>
+        <p:nvSpPr>
+          <p:cNvPr id="33" name="직사각형 32">
+            <a:extLst>
+              <a:ext uri="{FF2B5EF4-FFF2-40B4-BE49-F238E27FC236}">
+                <a16:creationId xmlns:a16="http://schemas.microsoft.com/office/drawing/2014/main" id="{48BBBFE0-9213-8A7C-2D88-7DF35ABBDFD1}"/>
+              </a:ext>
+            </a:extLst>
+          </p:cNvPr>
+          <p:cNvSpPr/>
+          <p:nvPr/>
+        </p:nvSpPr>
+        <p:spPr>
+          <a:xfrm>
+            <a:off x="4489583" y="5099972"/>
+            <a:ext cx="1504257" cy="922725"/>
+          </a:xfrm>
+          <a:prstGeom prst="rect">
+            <a:avLst/>
+          </a:prstGeom>
+          <a:ln>
+            <a:solidFill>
+              <a:schemeClr val="tx1"/>
+            </a:solidFill>
+          </a:ln>
+        </p:spPr>
+        <p:style>
+          <a:lnRef idx="2">
+            <a:schemeClr val="accent6"/>
+          </a:lnRef>
+          <a:fillRef idx="1">
+            <a:schemeClr val="lt1"/>
+          </a:fillRef>
+          <a:effectRef idx="0">
+            <a:schemeClr val="accent6"/>
+          </a:effectRef>
+          <a:fontRef idx="minor">
+            <a:schemeClr val="dk1"/>
+          </a:fontRef>
+        </p:style>
+        <p:txBody>
+          <a:bodyPr rtlCol="0" anchor="ctr"/>
+          <a:lstStyle/>
+          <a:p>
+            <a:pPr algn="ctr"/>
+            <a:r>
+              <a:rPr kumimoji="1" lang="en-US" altLang="ko-KR" dirty="0" err="1"/>
+              <a:t>MinIO</a:t>
+            </a:r>
+            <a:br>
+              <a:rPr kumimoji="1" lang="en-US" altLang="ko-KR" dirty="0"/>
+            </a:br>
+            <a:r>
+              <a:rPr kumimoji="1" lang="en-US" altLang="ko-KR" dirty="0"/>
+              <a:t>(</a:t>
+            </a:r>
+            <a:r>
+              <a:rPr kumimoji="1" lang="en-US" altLang="ko-KR" dirty="0" err="1"/>
+              <a:t>DataLake</a:t>
+            </a:r>
+            <a:r>
+              <a:rPr kumimoji="1" lang="en-US" altLang="ko-KR" dirty="0"/>
+              <a:t>)</a:t>
+            </a:r>
+            <a:endParaRPr kumimoji="1" lang="ko-KR" altLang="en-US" dirty="0"/>
+          </a:p>
+        </p:txBody>
+      </p:sp>
+      <p:pic>
+        <p:nvPicPr>
+          <p:cNvPr id="35" name="그림 34" descr="폰트, 로고, 그래픽, 상징이(가) 표시된 사진&#10;&#10;자동 생성된 설명">
+            <a:extLst>
+              <a:ext uri="{FF2B5EF4-FFF2-40B4-BE49-F238E27FC236}">
+                <a16:creationId xmlns:a16="http://schemas.microsoft.com/office/drawing/2014/main" id="{1CC3BA86-F42B-F985-91E4-6E13F077A392}"/>
+              </a:ext>
+            </a:extLst>
+          </p:cNvPr>
+          <p:cNvPicPr>
+            <a:picLocks noChangeAspect="1"/>
+          </p:cNvPicPr>
+          <p:nvPr/>
+        </p:nvPicPr>
+        <p:blipFill>
+          <a:blip r:embed="rId5"/>
+          <a:stretch>
+            <a:fillRect/>
+          </a:stretch>
+        </p:blipFill>
+        <p:spPr>
+          <a:xfrm>
+            <a:off x="4629882" y="4486573"/>
+            <a:ext cx="1212587" cy="613399"/>
+          </a:xfrm>
+          <a:prstGeom prst="rect">
+            <a:avLst/>
+          </a:prstGeom>
+        </p:spPr>
+      </p:pic>
+      <p:sp>
+        <p:nvSpPr>
+          <p:cNvPr id="36" name="오른쪽 화살표[R] 35">
+            <a:extLst>
+              <a:ext uri="{FF2B5EF4-FFF2-40B4-BE49-F238E27FC236}">
+                <a16:creationId xmlns:a16="http://schemas.microsoft.com/office/drawing/2014/main" id="{9CE040D5-D70F-33CA-16BF-7D38060BF490}"/>
+              </a:ext>
+            </a:extLst>
+          </p:cNvPr>
+          <p:cNvSpPr/>
+          <p:nvPr/>
+        </p:nvSpPr>
+        <p:spPr>
+          <a:xfrm>
+            <a:off x="2207171" y="5251125"/>
+            <a:ext cx="2102071" cy="680347"/>
+          </a:xfrm>
+          <a:prstGeom prst="rightArrow">
+            <a:avLst/>
+          </a:prstGeom>
+          <a:solidFill>
+            <a:schemeClr val="bg1"/>
+          </a:solidFill>
+        </p:spPr>
+        <p:style>
+          <a:lnRef idx="2">
+            <a:schemeClr val="accent1">
+              <a:shade val="15000"/>
+            </a:schemeClr>
+          </a:lnRef>
+          <a:fillRef idx="1">
+            <a:schemeClr val="accent1"/>
+          </a:fillRef>
+          <a:effectRef idx="0">
+            <a:schemeClr val="accent1"/>
+          </a:effectRef>
+          <a:fontRef idx="minor">
+            <a:schemeClr val="lt1"/>
+          </a:fontRef>
+        </p:style>
+        <p:txBody>
+          <a:bodyPr rtlCol="0" anchor="ctr"/>
+          <a:lstStyle/>
+          <a:p>
+            <a:pPr algn="ctr"/>
+            <a:r>
+              <a:rPr kumimoji="1" lang="en-US" altLang="ko-KR" dirty="0">
+                <a:solidFill>
+                  <a:schemeClr val="tx1"/>
+                </a:solidFill>
+              </a:rPr>
+              <a:t>Data</a:t>
+            </a:r>
+            <a:endParaRPr kumimoji="1" lang="ko-KR" altLang="en-US" dirty="0">
+              <a:solidFill>
+                <a:schemeClr val="tx1"/>
+              </a:solidFill>
+            </a:endParaRPr>
+          </a:p>
+        </p:txBody>
+      </p:sp>
+      <p:sp>
+        <p:nvSpPr>
+          <p:cNvPr id="37" name="오른쪽 화살표[R] 36">
+            <a:extLst>
+              <a:ext uri="{FF2B5EF4-FFF2-40B4-BE49-F238E27FC236}">
+                <a16:creationId xmlns:a16="http://schemas.microsoft.com/office/drawing/2014/main" id="{2081FAC5-597C-ED9A-8654-914F8F2D4B9E}"/>
+              </a:ext>
+            </a:extLst>
+          </p:cNvPr>
+          <p:cNvSpPr/>
+          <p:nvPr/>
+        </p:nvSpPr>
+        <p:spPr>
+          <a:xfrm rot="16200000">
+            <a:off x="4843010" y="3927763"/>
+            <a:ext cx="842786" cy="359750"/>
+          </a:xfrm>
+          <a:prstGeom prst="rightArrow">
+            <a:avLst/>
+          </a:prstGeom>
+          <a:solidFill>
+            <a:schemeClr val="bg1"/>
+          </a:solidFill>
+        </p:spPr>
+        <p:style>
+          <a:lnRef idx="2">
+            <a:schemeClr val="accent1">
+              <a:shade val="15000"/>
+            </a:schemeClr>
+          </a:lnRef>
+          <a:fillRef idx="1">
+            <a:schemeClr val="accent1"/>
+          </a:fillRef>
+          <a:effectRef idx="0">
+            <a:schemeClr val="accent1"/>
+          </a:effectRef>
+          <a:fontRef idx="minor">
+            <a:schemeClr val="lt1"/>
+          </a:fontRef>
+        </p:style>
+        <p:txBody>
+          <a:bodyPr rtlCol="0" anchor="ctr"/>
+          <a:lstStyle/>
+          <a:p>
+            <a:pPr algn="ctr"/>
+            <a:endParaRPr kumimoji="1" lang="ko-KR" altLang="en-US" dirty="0">
+              <a:solidFill>
+                <a:schemeClr val="tx1"/>
+              </a:solidFill>
+            </a:endParaRPr>
+          </a:p>
+        </p:txBody>
+      </p:sp>
+      <p:sp>
+        <p:nvSpPr>
+          <p:cNvPr id="38" name="TextBox 37">
+            <a:extLst>
+              <a:ext uri="{FF2B5EF4-FFF2-40B4-BE49-F238E27FC236}">
+                <a16:creationId xmlns:a16="http://schemas.microsoft.com/office/drawing/2014/main" id="{094AB2CE-D1DE-3B75-C150-145B21CAEA82}"/>
+              </a:ext>
+            </a:extLst>
+          </p:cNvPr>
+          <p:cNvSpPr txBox="1"/>
+          <p:nvPr/>
+        </p:nvSpPr>
+        <p:spPr>
+          <a:xfrm>
+            <a:off x="3891784" y="4000986"/>
+            <a:ext cx="1240981" cy="369332"/>
+          </a:xfrm>
+          <a:prstGeom prst="rect">
+            <a:avLst/>
+          </a:prstGeom>
+          <a:noFill/>
+        </p:spPr>
+        <p:txBody>
+          <a:bodyPr wrap="none" rtlCol="0">
+            <a:spAutoFit/>
+          </a:bodyPr>
+          <a:lstStyle/>
+          <a:p>
+            <a:r>
+              <a:rPr kumimoji="1" lang="en-US" altLang="ko-KR" dirty="0"/>
+              <a:t>Download</a:t>
+            </a:r>
+            <a:endParaRPr kumimoji="1" lang="ko-KR" altLang="en-US" dirty="0"/>
+          </a:p>
+        </p:txBody>
+      </p:sp>
+      <p:sp>
+        <p:nvSpPr>
+          <p:cNvPr id="39" name="오른쪽 화살표[R] 38">
+            <a:extLst>
+              <a:ext uri="{FF2B5EF4-FFF2-40B4-BE49-F238E27FC236}">
+                <a16:creationId xmlns:a16="http://schemas.microsoft.com/office/drawing/2014/main" id="{F36C145C-5863-65C7-37AB-9AADCE7D03D8}"/>
+              </a:ext>
+            </a:extLst>
+          </p:cNvPr>
+          <p:cNvSpPr/>
+          <p:nvPr/>
+        </p:nvSpPr>
+        <p:spPr>
+          <a:xfrm>
+            <a:off x="6226084" y="2348108"/>
+            <a:ext cx="1303283" cy="793196"/>
+          </a:xfrm>
+          <a:prstGeom prst="rightArrow">
+            <a:avLst/>
+          </a:prstGeom>
+          <a:solidFill>
+            <a:schemeClr val="bg1"/>
+          </a:solidFill>
+        </p:spPr>
+        <p:style>
+          <a:lnRef idx="2">
+            <a:schemeClr val="accent1">
+              <a:shade val="15000"/>
+            </a:schemeClr>
+          </a:lnRef>
+          <a:fillRef idx="1">
+            <a:schemeClr val="accent1"/>
+          </a:fillRef>
+          <a:effectRef idx="0">
+            <a:schemeClr val="accent1"/>
+          </a:effectRef>
+          <a:fontRef idx="minor">
+            <a:schemeClr val="lt1"/>
+          </a:fontRef>
+        </p:style>
+        <p:txBody>
+          <a:bodyPr rtlCol="0" anchor="ctr"/>
+          <a:lstStyle/>
+          <a:p>
+            <a:pPr algn="ctr"/>
+            <a:r>
+              <a:rPr kumimoji="1" lang="en-US" altLang="ko-KR" dirty="0">
+                <a:solidFill>
+                  <a:schemeClr val="tx1"/>
+                </a:solidFill>
+              </a:rPr>
+              <a:t>Data</a:t>
+            </a:r>
+            <a:endParaRPr kumimoji="1" lang="ko-KR" altLang="en-US" dirty="0">
+              <a:solidFill>
+                <a:schemeClr val="tx1"/>
+              </a:solidFill>
+            </a:endParaRPr>
+          </a:p>
+        </p:txBody>
+      </p:sp>
+      <p:pic>
+        <p:nvPicPr>
+          <p:cNvPr id="1026" name="Picture 2" descr="Backend]FastAPI 입문 1 : Uvicorn 이해하기, 간단한 웹 서버 구현">
+            <a:extLst>
+              <a:ext uri="{FF2B5EF4-FFF2-40B4-BE49-F238E27FC236}">
+                <a16:creationId xmlns:a16="http://schemas.microsoft.com/office/drawing/2014/main" id="{E9A4947C-F307-E4DA-4D7B-7779419AC5F0}"/>
+              </a:ext>
+            </a:extLst>
+          </p:cNvPr>
+          <p:cNvPicPr>
+            <a:picLocks noChangeAspect="1" noChangeArrowheads="1"/>
+          </p:cNvPicPr>
+          <p:nvPr/>
+        </p:nvPicPr>
+        <p:blipFill>
+          <a:blip r:embed="rId6">
+            <a:extLst>
+              <a:ext uri="{28A0092B-C50C-407E-A947-70E740481C1C}">
+                <a14:useLocalDpi xmlns:a14="http://schemas.microsoft.com/office/drawing/2010/main" val="0"/>
+              </a:ext>
+            </a:extLst>
+          </a:blip>
+          <a:srcRect/>
+          <a:stretch>
+            <a:fillRect/>
+          </a:stretch>
+        </p:blipFill>
+        <p:spPr bwMode="auto">
+          <a:xfrm>
+            <a:off x="7872867" y="1801089"/>
+            <a:ext cx="886207" cy="886207"/>
+          </a:xfrm>
+          <a:prstGeom prst="rect">
+            <a:avLst/>
+          </a:prstGeom>
+          <a:noFill/>
+          <a:extLst>
+            <a:ext uri="{909E8E84-426E-40DD-AFC4-6F175D3DCCD1}">
+              <a14:hiddenFill xmlns:a14="http://schemas.microsoft.com/office/drawing/2010/main">
+                <a:solidFill>
+                  <a:srgbClr val="FFFFFF"/>
+                </a:solidFill>
+              </a14:hiddenFill>
+            </a:ext>
+          </a:extLst>
+        </p:spPr>
+      </p:pic>
+      <p:pic>
+        <p:nvPicPr>
+          <p:cNvPr id="1028" name="Picture 4" descr="Backend]FastAPI 입문 1 : Uvicorn 이해하기, 간단한 웹 서버 구현">
+            <a:extLst>
+              <a:ext uri="{FF2B5EF4-FFF2-40B4-BE49-F238E27FC236}">
+                <a16:creationId xmlns:a16="http://schemas.microsoft.com/office/drawing/2014/main" id="{816471F5-0F7F-8AB0-DF02-FC734C0A3DB0}"/>
+              </a:ext>
+            </a:extLst>
+          </p:cNvPr>
+          <p:cNvPicPr>
+            <a:picLocks noChangeAspect="1" noChangeArrowheads="1"/>
+          </p:cNvPicPr>
+          <p:nvPr/>
+        </p:nvPicPr>
+        <p:blipFill>
+          <a:blip r:embed="rId7">
+            <a:extLst>
+              <a:ext uri="{28A0092B-C50C-407E-A947-70E740481C1C}">
+                <a14:useLocalDpi xmlns:a14="http://schemas.microsoft.com/office/drawing/2010/main" val="0"/>
+              </a:ext>
+            </a:extLst>
+          </a:blip>
+          <a:srcRect/>
+          <a:stretch>
+            <a:fillRect/>
+          </a:stretch>
+        </p:blipFill>
+        <p:spPr bwMode="auto">
+          <a:xfrm>
+            <a:off x="7380551" y="2486416"/>
+            <a:ext cx="1723697" cy="621698"/>
+          </a:xfrm>
+          <a:prstGeom prst="rect">
+            <a:avLst/>
+          </a:prstGeom>
+          <a:noFill/>
+          <a:extLst>
+            <a:ext uri="{909E8E84-426E-40DD-AFC4-6F175D3DCCD1}">
+              <a14:hiddenFill xmlns:a14="http://schemas.microsoft.com/office/drawing/2010/main">
+                <a:solidFill>
+                  <a:srgbClr val="FFFFFF"/>
+                </a:solidFill>
+              </a14:hiddenFill>
+            </a:ext>
+          </a:extLst>
+        </p:spPr>
+      </p:pic>
+      <p:sp>
+        <p:nvSpPr>
+          <p:cNvPr id="40" name="오른쪽 화살표[R] 39">
+            <a:extLst>
+              <a:ext uri="{FF2B5EF4-FFF2-40B4-BE49-F238E27FC236}">
+                <a16:creationId xmlns:a16="http://schemas.microsoft.com/office/drawing/2014/main" id="{300A0CCA-17C7-104E-01CA-691ACA85733B}"/>
+              </a:ext>
+            </a:extLst>
+          </p:cNvPr>
+          <p:cNvSpPr/>
+          <p:nvPr/>
+        </p:nvSpPr>
+        <p:spPr>
+          <a:xfrm>
+            <a:off x="9121234" y="2545896"/>
+            <a:ext cx="842786" cy="139504"/>
+          </a:xfrm>
+          <a:prstGeom prst="rightArrow">
+            <a:avLst/>
+          </a:prstGeom>
+          <a:solidFill>
+            <a:schemeClr val="bg1"/>
+          </a:solidFill>
+        </p:spPr>
+        <p:style>
+          <a:lnRef idx="2">
+            <a:schemeClr val="accent1">
+              <a:shade val="15000"/>
+            </a:schemeClr>
+          </a:lnRef>
+          <a:fillRef idx="1">
+            <a:schemeClr val="accent1"/>
+          </a:fillRef>
+          <a:effectRef idx="0">
+            <a:schemeClr val="accent1"/>
+          </a:effectRef>
+          <a:fontRef idx="minor">
+            <a:schemeClr val="lt1"/>
+          </a:fontRef>
+        </p:style>
+        <p:txBody>
+          <a:bodyPr rtlCol="0" anchor="ctr"/>
+          <a:lstStyle/>
+          <a:p>
+            <a:pPr algn="ctr"/>
+            <a:endParaRPr kumimoji="1" lang="ko-KR" altLang="en-US" dirty="0">
+              <a:solidFill>
+                <a:schemeClr val="tx1"/>
+              </a:solidFill>
+            </a:endParaRPr>
+          </a:p>
+        </p:txBody>
+      </p:sp>
+      <p:pic>
+        <p:nvPicPr>
+          <p:cNvPr id="44" name="그림 43" descr="로고, 폰트, 일렉트릭 블루, 그래픽이(가) 표시된 사진&#10;&#10;자동 생성된 설명">
+            <a:extLst>
+              <a:ext uri="{FF2B5EF4-FFF2-40B4-BE49-F238E27FC236}">
+                <a16:creationId xmlns:a16="http://schemas.microsoft.com/office/drawing/2014/main" id="{3E9ED678-536A-A64B-8DF6-FB2CC4803C55}"/>
+              </a:ext>
+            </a:extLst>
+          </p:cNvPr>
+          <p:cNvPicPr>
+            <a:picLocks noChangeAspect="1"/>
+          </p:cNvPicPr>
+          <p:nvPr/>
+        </p:nvPicPr>
+        <p:blipFill>
+          <a:blip r:embed="rId8"/>
+          <a:stretch>
+            <a:fillRect/>
+          </a:stretch>
+        </p:blipFill>
+        <p:spPr>
+          <a:xfrm>
+            <a:off x="9983366" y="1537229"/>
+            <a:ext cx="1643556" cy="547852"/>
+          </a:xfrm>
+          <a:prstGeom prst="rect">
+            <a:avLst/>
+          </a:prstGeom>
+        </p:spPr>
+      </p:pic>
+      <p:pic>
+        <p:nvPicPr>
+          <p:cNvPr id="45" name="그림 44" descr="로고, 폰트, 일렉트릭 블루, 그래픽이(가) 표시된 사진&#10;&#10;자동 생성된 설명">
+            <a:extLst>
+              <a:ext uri="{FF2B5EF4-FFF2-40B4-BE49-F238E27FC236}">
+                <a16:creationId xmlns:a16="http://schemas.microsoft.com/office/drawing/2014/main" id="{619F113F-A7FA-B8CD-A072-023FFDEDAB0E}"/>
+              </a:ext>
+            </a:extLst>
+          </p:cNvPr>
+          <p:cNvPicPr>
+            <a:picLocks noChangeAspect="1"/>
+          </p:cNvPicPr>
+          <p:nvPr/>
+        </p:nvPicPr>
+        <p:blipFill>
+          <a:blip r:embed="rId8"/>
+          <a:stretch>
+            <a:fillRect/>
+          </a:stretch>
+        </p:blipFill>
+        <p:spPr>
+          <a:xfrm>
+            <a:off x="9983366" y="2407064"/>
+            <a:ext cx="1643556" cy="547852"/>
+          </a:xfrm>
+          <a:prstGeom prst="rect">
+            <a:avLst/>
+          </a:prstGeom>
+        </p:spPr>
+      </p:pic>
+      <p:pic>
+        <p:nvPicPr>
+          <p:cNvPr id="46" name="그림 45" descr="로고, 폰트, 일렉트릭 블루, 그래픽이(가) 표시된 사진&#10;&#10;자동 생성된 설명">
+            <a:extLst>
+              <a:ext uri="{FF2B5EF4-FFF2-40B4-BE49-F238E27FC236}">
+                <a16:creationId xmlns:a16="http://schemas.microsoft.com/office/drawing/2014/main" id="{D33F0E39-DB62-CF0F-1F5C-12EF7E6ADC66}"/>
+              </a:ext>
+            </a:extLst>
+          </p:cNvPr>
+          <p:cNvPicPr>
+            <a:picLocks noChangeAspect="1"/>
+          </p:cNvPicPr>
+          <p:nvPr/>
+        </p:nvPicPr>
+        <p:blipFill>
+          <a:blip r:embed="rId8"/>
+          <a:stretch>
+            <a:fillRect/>
+          </a:stretch>
+        </p:blipFill>
+        <p:spPr>
+          <a:xfrm>
+            <a:off x="9983366" y="3134426"/>
+            <a:ext cx="1643556" cy="547852"/>
+          </a:xfrm>
+          <a:prstGeom prst="rect">
+            <a:avLst/>
+          </a:prstGeom>
+        </p:spPr>
+      </p:pic>
+      <p:pic>
+        <p:nvPicPr>
+          <p:cNvPr id="48" name="그림 47" descr="스크린샷, 그래픽, 일렉트릭 블루, 로고이(가) 표시된 사진&#10;&#10;자동 생성된 설명">
+            <a:extLst>
+              <a:ext uri="{FF2B5EF4-FFF2-40B4-BE49-F238E27FC236}">
+                <a16:creationId xmlns:a16="http://schemas.microsoft.com/office/drawing/2014/main" id="{F9C925D3-0A21-A9F4-614D-7CD53826A798}"/>
+              </a:ext>
+            </a:extLst>
+          </p:cNvPr>
+          <p:cNvPicPr>
+            <a:picLocks noChangeAspect="1"/>
+          </p:cNvPicPr>
+          <p:nvPr/>
+        </p:nvPicPr>
+        <p:blipFill rotWithShape="1">
+          <a:blip r:embed="rId9"/>
+          <a:srcRect l="1" r="2392"/>
+          <a:stretch/>
+        </p:blipFill>
+        <p:spPr>
+          <a:xfrm>
+            <a:off x="7962758" y="3004965"/>
+            <a:ext cx="706424" cy="710925"/>
+          </a:xfrm>
+          <a:prstGeom prst="rect">
+            <a:avLst/>
+          </a:prstGeom>
+        </p:spPr>
+      </p:pic>
+      <p:sp>
+        <p:nvSpPr>
+          <p:cNvPr id="49" name="오른쪽 화살표[R] 48">
+            <a:extLst>
+              <a:ext uri="{FF2B5EF4-FFF2-40B4-BE49-F238E27FC236}">
+                <a16:creationId xmlns:a16="http://schemas.microsoft.com/office/drawing/2014/main" id="{8FA106B5-0E18-8EAA-E11B-7A34328E7661}"/>
+              </a:ext>
+            </a:extLst>
+          </p:cNvPr>
+          <p:cNvSpPr/>
+          <p:nvPr/>
+        </p:nvSpPr>
+        <p:spPr>
+          <a:xfrm rot="10800000">
+            <a:off x="9043548" y="2681949"/>
+            <a:ext cx="842786" cy="139504"/>
+          </a:xfrm>
+          <a:prstGeom prst="rightArrow">
+            <a:avLst/>
+          </a:prstGeom>
+          <a:solidFill>
+            <a:schemeClr val="bg1"/>
+          </a:solidFill>
+        </p:spPr>
+        <p:style>
+          <a:lnRef idx="2">
+            <a:schemeClr val="accent1">
+              <a:shade val="15000"/>
+            </a:schemeClr>
+          </a:lnRef>
+          <a:fillRef idx="1">
+            <a:schemeClr val="accent1"/>
+          </a:fillRef>
+          <a:effectRef idx="0">
+            <a:schemeClr val="accent1"/>
+          </a:effectRef>
+          <a:fontRef idx="minor">
+            <a:schemeClr val="lt1"/>
+          </a:fontRef>
+        </p:style>
+        <p:txBody>
+          <a:bodyPr rtlCol="0" anchor="ctr"/>
+          <a:lstStyle/>
+          <a:p>
+            <a:pPr algn="ctr"/>
+            <a:endParaRPr kumimoji="1" lang="ko-KR" altLang="en-US" dirty="0">
+              <a:solidFill>
+                <a:schemeClr val="tx1"/>
+              </a:solidFill>
+            </a:endParaRPr>
+          </a:p>
+        </p:txBody>
+      </p:sp>
+      <p:sp>
+        <p:nvSpPr>
+          <p:cNvPr id="50" name="오른쪽 화살표[R] 49">
+            <a:extLst>
+              <a:ext uri="{FF2B5EF4-FFF2-40B4-BE49-F238E27FC236}">
+                <a16:creationId xmlns:a16="http://schemas.microsoft.com/office/drawing/2014/main" id="{79FD1434-7483-AA20-9B87-85173EB3DD0B}"/>
+              </a:ext>
+            </a:extLst>
+          </p:cNvPr>
+          <p:cNvSpPr/>
+          <p:nvPr/>
+        </p:nvSpPr>
+        <p:spPr>
+          <a:xfrm rot="1800000">
+            <a:off x="9126515" y="3030311"/>
+            <a:ext cx="842786" cy="139504"/>
+          </a:xfrm>
+          <a:prstGeom prst="rightArrow">
+            <a:avLst/>
+          </a:prstGeom>
+          <a:solidFill>
+            <a:schemeClr val="bg1"/>
+          </a:solidFill>
+        </p:spPr>
+        <p:style>
+          <a:lnRef idx="2">
+            <a:schemeClr val="accent1">
+              <a:shade val="15000"/>
+            </a:schemeClr>
+          </a:lnRef>
+          <a:fillRef idx="1">
+            <a:schemeClr val="accent1"/>
+          </a:fillRef>
+          <a:effectRef idx="0">
+            <a:schemeClr val="accent1"/>
+          </a:effectRef>
+          <a:fontRef idx="minor">
+            <a:schemeClr val="lt1"/>
+          </a:fontRef>
+        </p:style>
+        <p:txBody>
+          <a:bodyPr rtlCol="0" anchor="ctr"/>
+          <a:lstStyle/>
+          <a:p>
+            <a:pPr algn="ctr"/>
+            <a:endParaRPr kumimoji="1" lang="ko-KR" altLang="en-US" dirty="0">
+              <a:solidFill>
+                <a:schemeClr val="tx1"/>
+              </a:solidFill>
+            </a:endParaRPr>
+          </a:p>
+        </p:txBody>
+      </p:sp>
+      <p:sp>
+        <p:nvSpPr>
+          <p:cNvPr id="51" name="오른쪽 화살표[R] 50">
+            <a:extLst>
+              <a:ext uri="{FF2B5EF4-FFF2-40B4-BE49-F238E27FC236}">
+                <a16:creationId xmlns:a16="http://schemas.microsoft.com/office/drawing/2014/main" id="{2CCBD302-AC1E-3820-22E6-FB676E9D3716}"/>
+              </a:ext>
+            </a:extLst>
+          </p:cNvPr>
+          <p:cNvSpPr/>
+          <p:nvPr/>
+        </p:nvSpPr>
+        <p:spPr>
+          <a:xfrm rot="12600000">
+            <a:off x="9048829" y="3166364"/>
+            <a:ext cx="842786" cy="139504"/>
+          </a:xfrm>
+          <a:prstGeom prst="rightArrow">
+            <a:avLst/>
+          </a:prstGeom>
+          <a:solidFill>
+            <a:schemeClr val="bg1"/>
+          </a:solidFill>
+        </p:spPr>
+        <p:style>
+          <a:lnRef idx="2">
+            <a:schemeClr val="accent1">
+              <a:shade val="15000"/>
+            </a:schemeClr>
+          </a:lnRef>
+          <a:fillRef idx="1">
+            <a:schemeClr val="accent1"/>
+          </a:fillRef>
+          <a:effectRef idx="0">
+            <a:schemeClr val="accent1"/>
+          </a:effectRef>
+          <a:fontRef idx="minor">
+            <a:schemeClr val="lt1"/>
+          </a:fontRef>
+        </p:style>
+        <p:txBody>
+          <a:bodyPr rtlCol="0" anchor="ctr"/>
+          <a:lstStyle/>
+          <a:p>
+            <a:pPr algn="ctr"/>
+            <a:endParaRPr kumimoji="1" lang="ko-KR" altLang="en-US" dirty="0">
+              <a:solidFill>
+                <a:schemeClr val="tx1"/>
+              </a:solidFill>
+            </a:endParaRPr>
+          </a:p>
+        </p:txBody>
+      </p:sp>
+      <p:sp>
+        <p:nvSpPr>
+          <p:cNvPr id="54" name="오른쪽 화살표[R] 53">
+            <a:extLst>
+              <a:ext uri="{FF2B5EF4-FFF2-40B4-BE49-F238E27FC236}">
+                <a16:creationId xmlns:a16="http://schemas.microsoft.com/office/drawing/2014/main" id="{0B55BD03-DB36-4F37-CFD5-BF91ECDB1E92}"/>
+              </a:ext>
+            </a:extLst>
+          </p:cNvPr>
+          <p:cNvSpPr/>
+          <p:nvPr/>
+        </p:nvSpPr>
+        <p:spPr>
+          <a:xfrm rot="19800000">
+            <a:off x="9080995" y="1964001"/>
+            <a:ext cx="842786" cy="139504"/>
+          </a:xfrm>
+          <a:prstGeom prst="rightArrow">
+            <a:avLst/>
+          </a:prstGeom>
+          <a:solidFill>
+            <a:schemeClr val="bg1"/>
+          </a:solidFill>
+        </p:spPr>
+        <p:style>
+          <a:lnRef idx="2">
+            <a:schemeClr val="accent1">
+              <a:shade val="15000"/>
+            </a:schemeClr>
+          </a:lnRef>
+          <a:fillRef idx="1">
+            <a:schemeClr val="accent1"/>
+          </a:fillRef>
+          <a:effectRef idx="0">
+            <a:schemeClr val="accent1"/>
+          </a:effectRef>
+          <a:fontRef idx="minor">
+            <a:schemeClr val="lt1"/>
+          </a:fontRef>
+        </p:style>
+        <p:txBody>
+          <a:bodyPr rtlCol="0" anchor="ctr"/>
+          <a:lstStyle/>
+          <a:p>
+            <a:pPr algn="ctr"/>
+            <a:endParaRPr kumimoji="1" lang="ko-KR" altLang="en-US" dirty="0">
+              <a:solidFill>
+                <a:schemeClr val="tx1"/>
+              </a:solidFill>
+            </a:endParaRPr>
+          </a:p>
+        </p:txBody>
+      </p:sp>
+      <p:sp>
+        <p:nvSpPr>
+          <p:cNvPr id="55" name="오른쪽 화살표[R] 54">
+            <a:extLst>
+              <a:ext uri="{FF2B5EF4-FFF2-40B4-BE49-F238E27FC236}">
+                <a16:creationId xmlns:a16="http://schemas.microsoft.com/office/drawing/2014/main" id="{4C6E98DC-DCC1-1BCD-3CD9-88C80726DF18}"/>
+              </a:ext>
+            </a:extLst>
+          </p:cNvPr>
+          <p:cNvSpPr/>
+          <p:nvPr/>
+        </p:nvSpPr>
+        <p:spPr>
+          <a:xfrm rot="9000000">
+            <a:off x="9055859" y="2100054"/>
+            <a:ext cx="842786" cy="139504"/>
+          </a:xfrm>
+          <a:prstGeom prst="rightArrow">
+            <a:avLst/>
+          </a:prstGeom>
+          <a:solidFill>
+            <a:schemeClr val="bg1"/>
+          </a:solidFill>
+        </p:spPr>
+        <p:style>
+          <a:lnRef idx="2">
+            <a:schemeClr val="accent1">
+              <a:shade val="15000"/>
+            </a:schemeClr>
+          </a:lnRef>
+          <a:fillRef idx="1">
+            <a:schemeClr val="accent1"/>
+          </a:fillRef>
+          <a:effectRef idx="0">
+            <a:schemeClr val="accent1"/>
+          </a:effectRef>
+          <a:fontRef idx="minor">
+            <a:schemeClr val="lt1"/>
+          </a:fontRef>
+        </p:style>
+        <p:txBody>
+          <a:bodyPr rtlCol="0" anchor="ctr"/>
+          <a:lstStyle/>
+          <a:p>
+            <a:pPr algn="ctr"/>
+            <a:endParaRPr kumimoji="1" lang="ko-KR" altLang="en-US" dirty="0">
+              <a:solidFill>
+                <a:schemeClr val="tx1"/>
+              </a:solidFill>
+            </a:endParaRPr>
+          </a:p>
+        </p:txBody>
+      </p:sp>
+      <p:sp>
+        <p:nvSpPr>
+          <p:cNvPr id="56" name="TextBox 55">
+            <a:extLst>
+              <a:ext uri="{FF2B5EF4-FFF2-40B4-BE49-F238E27FC236}">
+                <a16:creationId xmlns:a16="http://schemas.microsoft.com/office/drawing/2014/main" id="{D893F1A5-770B-B285-F928-D619004E261F}"/>
+              </a:ext>
+            </a:extLst>
+          </p:cNvPr>
+          <p:cNvSpPr txBox="1"/>
+          <p:nvPr/>
+        </p:nvSpPr>
+        <p:spPr>
+          <a:xfrm>
+            <a:off x="7380551" y="3661288"/>
+            <a:ext cx="2281266" cy="307777"/>
+          </a:xfrm>
+          <a:prstGeom prst="rect">
+            <a:avLst/>
+          </a:prstGeom>
+          <a:noFill/>
+        </p:spPr>
+        <p:txBody>
+          <a:bodyPr wrap="square" rtlCol="0">
+            <a:spAutoFit/>
+          </a:bodyPr>
+          <a:lstStyle/>
+          <a:p>
+            <a:r>
+              <a:rPr kumimoji="1" lang="en-US" altLang="ko-KR" sz="1400" dirty="0"/>
+              <a:t>Background remove</a:t>
+            </a:r>
+            <a:endParaRPr kumimoji="1" lang="ko-KR" altLang="en-US" sz="1400" dirty="0"/>
+          </a:p>
+        </p:txBody>
+      </p:sp>
+      <p:sp>
+        <p:nvSpPr>
+          <p:cNvPr id="57" name="직사각형 56">
+            <a:extLst>
+              <a:ext uri="{FF2B5EF4-FFF2-40B4-BE49-F238E27FC236}">
+                <a16:creationId xmlns:a16="http://schemas.microsoft.com/office/drawing/2014/main" id="{B1431185-BFA1-6C4B-A3EF-2CB986E92469}"/>
+              </a:ext>
+            </a:extLst>
+          </p:cNvPr>
+          <p:cNvSpPr/>
+          <p:nvPr/>
+        </p:nvSpPr>
+        <p:spPr>
+          <a:xfrm>
+            <a:off x="274081" y="1830987"/>
+            <a:ext cx="924109" cy="302623"/>
+          </a:xfrm>
+          <a:prstGeom prst="rect">
+            <a:avLst/>
+          </a:prstGeom>
+          <a:ln>
+            <a:solidFill>
+              <a:schemeClr val="tx1"/>
+            </a:solidFill>
+          </a:ln>
+        </p:spPr>
+        <p:style>
+          <a:lnRef idx="2">
+            <a:schemeClr val="accent6"/>
+          </a:lnRef>
+          <a:fillRef idx="1">
+            <a:schemeClr val="lt1"/>
+          </a:fillRef>
+          <a:effectRef idx="0">
+            <a:schemeClr val="accent6"/>
+          </a:effectRef>
+          <a:fontRef idx="minor">
+            <a:schemeClr val="dk1"/>
+          </a:fontRef>
+        </p:style>
+        <p:txBody>
+          <a:bodyPr rtlCol="0" anchor="ctr"/>
+          <a:lstStyle/>
+          <a:p>
+            <a:pPr algn="ctr"/>
+            <a:r>
+              <a:rPr kumimoji="1" lang="en-US" altLang="ko-KR" sz="1300" dirty="0"/>
+              <a:t>Publish</a:t>
+            </a:r>
+            <a:endParaRPr kumimoji="1" lang="ko-KR" altLang="en-US" sz="1300" dirty="0"/>
+          </a:p>
+        </p:txBody>
+      </p:sp>
+      <p:sp>
+        <p:nvSpPr>
+          <p:cNvPr id="59" name="직사각형 58">
+            <a:extLst>
+              <a:ext uri="{FF2B5EF4-FFF2-40B4-BE49-F238E27FC236}">
+                <a16:creationId xmlns:a16="http://schemas.microsoft.com/office/drawing/2014/main" id="{EBC16F5C-159F-CA6C-8C4F-57A32920B0D8}"/>
+              </a:ext>
+            </a:extLst>
+          </p:cNvPr>
+          <p:cNvSpPr/>
+          <p:nvPr/>
+        </p:nvSpPr>
+        <p:spPr>
+          <a:xfrm>
+            <a:off x="97075" y="2265713"/>
+            <a:ext cx="1125460" cy="302623"/>
+          </a:xfrm>
+          <a:prstGeom prst="rect">
+            <a:avLst/>
+          </a:prstGeom>
+          <a:ln>
+            <a:solidFill>
+              <a:schemeClr val="tx1"/>
+            </a:solidFill>
+          </a:ln>
+        </p:spPr>
+        <p:style>
+          <a:lnRef idx="2">
+            <a:schemeClr val="accent6"/>
+          </a:lnRef>
+          <a:fillRef idx="1">
+            <a:schemeClr val="lt1"/>
+          </a:fillRef>
+          <a:effectRef idx="0">
+            <a:schemeClr val="accent6"/>
+          </a:effectRef>
+          <a:fontRef idx="minor">
+            <a:schemeClr val="dk1"/>
+          </a:fontRef>
+        </p:style>
+        <p:txBody>
+          <a:bodyPr rtlCol="0" anchor="ctr"/>
+          <a:lstStyle/>
+          <a:p>
+            <a:pPr algn="ctr"/>
+            <a:r>
+              <a:rPr kumimoji="1" lang="en-US" altLang="ko-KR" sz="1300" dirty="0" err="1"/>
+              <a:t>EasyVtuber</a:t>
+            </a:r>
+            <a:endParaRPr kumimoji="1" lang="ko-KR" altLang="en-US" sz="1300" dirty="0"/>
+          </a:p>
+        </p:txBody>
+      </p:sp>
+      <p:pic>
+        <p:nvPicPr>
+          <p:cNvPr id="1030" name="Picture 6" descr="Dlib - Wikipedia">
+            <a:extLst>
+              <a:ext uri="{FF2B5EF4-FFF2-40B4-BE49-F238E27FC236}">
+                <a16:creationId xmlns:a16="http://schemas.microsoft.com/office/drawing/2014/main" id="{F54967A5-03A2-9854-9DD3-E3D467FEDB89}"/>
+              </a:ext>
+            </a:extLst>
+          </p:cNvPr>
+          <p:cNvPicPr>
+            <a:picLocks noChangeAspect="1" noChangeArrowheads="1"/>
+          </p:cNvPicPr>
+          <p:nvPr/>
+        </p:nvPicPr>
+        <p:blipFill>
+          <a:blip r:embed="rId10">
+            <a:extLst>
+              <a:ext uri="{28A0092B-C50C-407E-A947-70E740481C1C}">
+                <a14:useLocalDpi xmlns:a14="http://schemas.microsoft.com/office/drawing/2010/main" val="0"/>
+              </a:ext>
+            </a:extLst>
+          </a:blip>
+          <a:srcRect/>
+          <a:stretch>
+            <a:fillRect/>
+          </a:stretch>
+        </p:blipFill>
+        <p:spPr bwMode="auto">
+          <a:xfrm>
+            <a:off x="96606" y="1447658"/>
+            <a:ext cx="466422" cy="332823"/>
+          </a:xfrm>
+          <a:prstGeom prst="rect">
+            <a:avLst/>
+          </a:prstGeom>
+          <a:noFill/>
+          <a:extLst>
+            <a:ext uri="{909E8E84-426E-40DD-AFC4-6F175D3DCCD1}">
+              <a14:hiddenFill xmlns:a14="http://schemas.microsoft.com/office/drawing/2010/main">
+                <a:solidFill>
+                  <a:srgbClr val="FFFFFF"/>
+                </a:solidFill>
+              </a14:hiddenFill>
+            </a:ext>
+          </a:extLst>
+        </p:spPr>
+      </p:pic>
+      <p:sp>
+        <p:nvSpPr>
+          <p:cNvPr id="60" name="TextBox 59">
+            <a:extLst>
+              <a:ext uri="{FF2B5EF4-FFF2-40B4-BE49-F238E27FC236}">
+                <a16:creationId xmlns:a16="http://schemas.microsoft.com/office/drawing/2014/main" id="{E65DB22B-E6EE-5879-7AB2-D2518F461EA8}"/>
+              </a:ext>
+            </a:extLst>
+          </p:cNvPr>
+          <p:cNvSpPr txBox="1"/>
+          <p:nvPr/>
+        </p:nvSpPr>
+        <p:spPr>
+          <a:xfrm>
+            <a:off x="581711" y="1447658"/>
+            <a:ext cx="2281266" cy="307777"/>
+          </a:xfrm>
+          <a:prstGeom prst="rect">
+            <a:avLst/>
+          </a:prstGeom>
+          <a:noFill/>
+        </p:spPr>
+        <p:txBody>
+          <a:bodyPr wrap="square" rtlCol="0">
+            <a:spAutoFit/>
+          </a:bodyPr>
+          <a:lstStyle/>
+          <a:p>
+            <a:r>
+              <a:rPr kumimoji="1" lang="en-US" altLang="ko-KR" sz="1400" dirty="0"/>
+              <a:t>Face detection</a:t>
+            </a:r>
+            <a:endParaRPr kumimoji="1" lang="ko-KR" altLang="en-US" sz="1400" dirty="0"/>
+          </a:p>
+        </p:txBody>
+      </p:sp>
+      <p:pic>
+        <p:nvPicPr>
+          <p:cNvPr id="62" name="그림 61" descr="클립아트, 상징, 실루엣이(가) 표시된 사진&#10;&#10;자동 생성된 설명">
+            <a:extLst>
+              <a:ext uri="{FF2B5EF4-FFF2-40B4-BE49-F238E27FC236}">
+                <a16:creationId xmlns:a16="http://schemas.microsoft.com/office/drawing/2014/main" id="{6A614C4A-C6E1-D98A-869A-A985B8664440}"/>
+              </a:ext>
+            </a:extLst>
+          </p:cNvPr>
+          <p:cNvPicPr>
+            <a:picLocks noChangeAspect="1"/>
+          </p:cNvPicPr>
+          <p:nvPr/>
+        </p:nvPicPr>
+        <p:blipFill>
+          <a:blip r:embed="rId11"/>
+          <a:stretch>
+            <a:fillRect/>
+          </a:stretch>
+        </p:blipFill>
+        <p:spPr>
+          <a:xfrm>
+            <a:off x="196349" y="1045913"/>
+            <a:ext cx="366679" cy="372383"/>
+          </a:xfrm>
+          <a:prstGeom prst="rect">
+            <a:avLst/>
+          </a:prstGeom>
+        </p:spPr>
+      </p:pic>
+      <p:sp>
+        <p:nvSpPr>
+          <p:cNvPr id="1024" name="TextBox 1023">
+            <a:extLst>
+              <a:ext uri="{FF2B5EF4-FFF2-40B4-BE49-F238E27FC236}">
+                <a16:creationId xmlns:a16="http://schemas.microsoft.com/office/drawing/2014/main" id="{241711F4-955C-0EC9-D4F5-27C7FA979A61}"/>
+              </a:ext>
+            </a:extLst>
+          </p:cNvPr>
+          <p:cNvSpPr txBox="1"/>
+          <p:nvPr/>
+        </p:nvSpPr>
+        <p:spPr>
+          <a:xfrm>
+            <a:off x="563028" y="1133686"/>
+            <a:ext cx="2281266" cy="307777"/>
+          </a:xfrm>
+          <a:prstGeom prst="rect">
+            <a:avLst/>
+          </a:prstGeom>
+          <a:noFill/>
+        </p:spPr>
+        <p:txBody>
+          <a:bodyPr wrap="square" rtlCol="0">
+            <a:spAutoFit/>
+          </a:bodyPr>
+          <a:lstStyle/>
+          <a:p>
+            <a:r>
+              <a:rPr kumimoji="1" lang="en-US" altLang="ko-KR" sz="1400" dirty="0"/>
+              <a:t>Open Source</a:t>
+            </a:r>
+            <a:endParaRPr kumimoji="1" lang="ko-KR" altLang="en-US" sz="1400" dirty="0"/>
+          </a:p>
+        </p:txBody>
+      </p:sp>
+      <p:sp>
+        <p:nvSpPr>
+          <p:cNvPr id="1025" name="오른쪽 화살표[R] 1024">
+            <a:extLst>
+              <a:ext uri="{FF2B5EF4-FFF2-40B4-BE49-F238E27FC236}">
+                <a16:creationId xmlns:a16="http://schemas.microsoft.com/office/drawing/2014/main" id="{1D2D7700-FEBC-1A11-B8D5-FD3A7CF2DE64}"/>
+              </a:ext>
+            </a:extLst>
+          </p:cNvPr>
+          <p:cNvSpPr/>
+          <p:nvPr/>
+        </p:nvSpPr>
+        <p:spPr>
+          <a:xfrm rot="10800000">
+            <a:off x="6173233" y="3085374"/>
+            <a:ext cx="1269724" cy="430736"/>
+          </a:xfrm>
+          <a:prstGeom prst="rightArrow">
+            <a:avLst/>
+          </a:prstGeom>
+          <a:solidFill>
+            <a:schemeClr val="bg1"/>
+          </a:solidFill>
+        </p:spPr>
+        <p:style>
+          <a:lnRef idx="2">
+            <a:schemeClr val="accent1">
+              <a:shade val="15000"/>
+            </a:schemeClr>
+          </a:lnRef>
+          <a:fillRef idx="1">
+            <a:schemeClr val="accent1"/>
+          </a:fillRef>
+          <a:effectRef idx="0">
+            <a:schemeClr val="accent1"/>
+          </a:effectRef>
+          <a:fontRef idx="minor">
+            <a:schemeClr val="lt1"/>
+          </a:fontRef>
+        </p:style>
+        <p:txBody>
+          <a:bodyPr rtlCol="0" anchor="ctr"/>
+          <a:lstStyle/>
+          <a:p>
+            <a:pPr algn="ctr"/>
+            <a:endParaRPr kumimoji="1" lang="ko-KR" altLang="en-US" dirty="0">
+              <a:solidFill>
+                <a:schemeClr val="tx1"/>
+              </a:solidFill>
+            </a:endParaRPr>
+          </a:p>
+        </p:txBody>
+      </p:sp>
+      <p:sp>
+        <p:nvSpPr>
+          <p:cNvPr id="1027" name="TextBox 1026">
+            <a:extLst>
+              <a:ext uri="{FF2B5EF4-FFF2-40B4-BE49-F238E27FC236}">
+                <a16:creationId xmlns:a16="http://schemas.microsoft.com/office/drawing/2014/main" id="{A7222319-132B-5EF1-68C0-5B970488F13D}"/>
+              </a:ext>
+            </a:extLst>
+          </p:cNvPr>
+          <p:cNvSpPr txBox="1"/>
+          <p:nvPr/>
+        </p:nvSpPr>
+        <p:spPr>
+          <a:xfrm>
+            <a:off x="6422878" y="3134426"/>
+            <a:ext cx="925253" cy="338554"/>
+          </a:xfrm>
+          <a:prstGeom prst="rect">
+            <a:avLst/>
+          </a:prstGeom>
+          <a:noFill/>
+        </p:spPr>
+        <p:txBody>
+          <a:bodyPr wrap="none" rtlCol="0">
+            <a:spAutoFit/>
+          </a:bodyPr>
+          <a:lstStyle/>
+          <a:p>
+            <a:r>
+              <a:rPr kumimoji="1" lang="en-US" altLang="ko-KR" sz="1600" dirty="0"/>
+              <a:t>SD data</a:t>
+            </a:r>
+            <a:endParaRPr kumimoji="1" lang="ko-KR" altLang="en-US" sz="1600" dirty="0"/>
+          </a:p>
+        </p:txBody>
+      </p:sp>
+      <p:sp>
+        <p:nvSpPr>
+          <p:cNvPr id="1029" name="굽은 화살표[B] 1028">
+            <a:extLst>
+              <a:ext uri="{FF2B5EF4-FFF2-40B4-BE49-F238E27FC236}">
+                <a16:creationId xmlns:a16="http://schemas.microsoft.com/office/drawing/2014/main" id="{D4BC73A3-56ED-3680-B887-1CC7BB95A4DE}"/>
+              </a:ext>
+            </a:extLst>
+          </p:cNvPr>
+          <p:cNvSpPr/>
+          <p:nvPr/>
+        </p:nvSpPr>
+        <p:spPr>
+          <a:xfrm rot="20354683" flipH="1">
+            <a:off x="1894516" y="1174781"/>
+            <a:ext cx="2821342" cy="1009766"/>
+          </a:xfrm>
+          <a:prstGeom prst="bentArrow">
+            <a:avLst>
+              <a:gd name="adj1" fmla="val 18516"/>
+              <a:gd name="adj2" fmla="val 26521"/>
+              <a:gd name="adj3" fmla="val 25000"/>
+              <a:gd name="adj4" fmla="val 85979"/>
+            </a:avLst>
+          </a:prstGeom>
+          <a:solidFill>
+            <a:schemeClr val="bg1"/>
+          </a:solidFill>
+          <a:ln>
+            <a:solidFill>
+              <a:schemeClr val="tx1"/>
+            </a:solidFill>
+          </a:ln>
+        </p:spPr>
+        <p:style>
+          <a:lnRef idx="2">
+            <a:schemeClr val="accent6"/>
+          </a:lnRef>
+          <a:fillRef idx="1">
+            <a:schemeClr val="lt1"/>
+          </a:fillRef>
+          <a:effectRef idx="0">
+            <a:schemeClr val="accent6"/>
+          </a:effectRef>
+          <a:fontRef idx="minor">
+            <a:schemeClr val="dk1"/>
+          </a:fontRef>
+        </p:style>
+        <p:txBody>
+          <a:bodyPr rtlCol="0" anchor="ctr"/>
+          <a:lstStyle/>
+          <a:p>
+            <a:pPr algn="ctr"/>
+            <a:endParaRPr kumimoji="1" lang="ko-KR" altLang="en-US" dirty="0">
+              <a:solidFill>
+                <a:schemeClr val="tx1"/>
+              </a:solidFill>
+            </a:endParaRPr>
+          </a:p>
+        </p:txBody>
+      </p:sp>
+      <p:sp>
+        <p:nvSpPr>
+          <p:cNvPr id="1031" name="TextBox 1030">
+            <a:extLst>
+              <a:ext uri="{FF2B5EF4-FFF2-40B4-BE49-F238E27FC236}">
+                <a16:creationId xmlns:a16="http://schemas.microsoft.com/office/drawing/2014/main" id="{0BEEA7D0-0971-9AA5-5DBB-B7CFFFAEDDE8}"/>
+              </a:ext>
+            </a:extLst>
+          </p:cNvPr>
+          <p:cNvSpPr txBox="1"/>
+          <p:nvPr/>
+        </p:nvSpPr>
+        <p:spPr>
+          <a:xfrm rot="20279669">
+            <a:off x="2435829" y="1063412"/>
+            <a:ext cx="1016625" cy="369332"/>
+          </a:xfrm>
+          <a:prstGeom prst="rect">
+            <a:avLst/>
+          </a:prstGeom>
+          <a:noFill/>
+        </p:spPr>
+        <p:txBody>
+          <a:bodyPr wrap="none" rtlCol="0">
+            <a:spAutoFit/>
+          </a:bodyPr>
+          <a:lstStyle/>
+          <a:p>
+            <a:r>
+              <a:rPr kumimoji="1" lang="en-US" altLang="ko-KR" dirty="0"/>
+              <a:t>SD data</a:t>
+            </a:r>
+            <a:endParaRPr kumimoji="1" lang="ko-KR" altLang="en-US" dirty="0"/>
+          </a:p>
+        </p:txBody>
+      </p:sp>
+      <p:sp>
+        <p:nvSpPr>
+          <p:cNvPr id="1033" name="TextBox 1032">
+            <a:extLst>
+              <a:ext uri="{FF2B5EF4-FFF2-40B4-BE49-F238E27FC236}">
+                <a16:creationId xmlns:a16="http://schemas.microsoft.com/office/drawing/2014/main" id="{61AFAADF-E2D2-6984-04FF-201C4E432B8A}"/>
+              </a:ext>
+            </a:extLst>
+          </p:cNvPr>
+          <p:cNvSpPr txBox="1"/>
+          <p:nvPr/>
+        </p:nvSpPr>
+        <p:spPr>
+          <a:xfrm>
+            <a:off x="2238027" y="3084728"/>
+            <a:ext cx="1240661" cy="307777"/>
+          </a:xfrm>
+          <a:prstGeom prst="rect">
+            <a:avLst/>
+          </a:prstGeom>
+          <a:noFill/>
+        </p:spPr>
+        <p:txBody>
+          <a:bodyPr wrap="square" rtlCol="0">
+            <a:spAutoFit/>
+          </a:bodyPr>
+          <a:lstStyle/>
+          <a:p>
+            <a:r>
+              <a:rPr kumimoji="1" lang="en-US" altLang="ko-KR" sz="1400" dirty="0" err="1"/>
+              <a:t>CCTV.detect</a:t>
+            </a:r>
+            <a:endParaRPr kumimoji="1" lang="ko-KR" altLang="en-US" sz="1400" dirty="0"/>
+          </a:p>
+        </p:txBody>
+      </p:sp>
+      <p:pic>
+        <p:nvPicPr>
+          <p:cNvPr id="1034" name="그림 1033">
+            <a:extLst>
+              <a:ext uri="{FF2B5EF4-FFF2-40B4-BE49-F238E27FC236}">
+                <a16:creationId xmlns:a16="http://schemas.microsoft.com/office/drawing/2014/main" id="{7A147D4C-6240-6BDB-958D-8B320633071E}"/>
+              </a:ext>
+            </a:extLst>
+          </p:cNvPr>
+          <p:cNvPicPr>
+            <a:picLocks noChangeAspect="1"/>
+          </p:cNvPicPr>
+          <p:nvPr/>
+        </p:nvPicPr>
+        <p:blipFill>
+          <a:blip r:embed="rId12"/>
+          <a:stretch>
+            <a:fillRect/>
+          </a:stretch>
+        </p:blipFill>
+        <p:spPr>
+          <a:xfrm>
+            <a:off x="8974070" y="4642787"/>
+            <a:ext cx="1739560" cy="1739560"/>
+          </a:xfrm>
+          <a:prstGeom prst="rect">
+            <a:avLst/>
+          </a:prstGeom>
+        </p:spPr>
+      </p:pic>
+      <p:pic>
+        <p:nvPicPr>
+          <p:cNvPr id="1036" name="그림 1035">
+            <a:extLst>
+              <a:ext uri="{FF2B5EF4-FFF2-40B4-BE49-F238E27FC236}">
+                <a16:creationId xmlns:a16="http://schemas.microsoft.com/office/drawing/2014/main" id="{700E0B83-18B4-3714-F873-AB83955353CE}"/>
+              </a:ext>
+            </a:extLst>
+          </p:cNvPr>
+          <p:cNvPicPr>
+            <a:picLocks noChangeAspect="1"/>
+          </p:cNvPicPr>
+          <p:nvPr/>
+        </p:nvPicPr>
+        <p:blipFill>
+          <a:blip r:embed="rId13"/>
+          <a:stretch>
+            <a:fillRect/>
+          </a:stretch>
+        </p:blipFill>
+        <p:spPr>
+          <a:xfrm>
+            <a:off x="10311672" y="4924246"/>
+            <a:ext cx="1507164" cy="1507164"/>
+          </a:xfrm>
+          <a:prstGeom prst="rect">
+            <a:avLst/>
+          </a:prstGeom>
+        </p:spPr>
+      </p:pic>
+      <p:pic>
+        <p:nvPicPr>
+          <p:cNvPr id="1037" name="그림 1036">
+            <a:extLst>
+              <a:ext uri="{FF2B5EF4-FFF2-40B4-BE49-F238E27FC236}">
+                <a16:creationId xmlns:a16="http://schemas.microsoft.com/office/drawing/2014/main" id="{3067A77A-95C6-F9BB-F010-842E622D0509}"/>
+              </a:ext>
+            </a:extLst>
+          </p:cNvPr>
+          <p:cNvPicPr>
+            <a:picLocks noChangeAspect="1"/>
+          </p:cNvPicPr>
+          <p:nvPr/>
+        </p:nvPicPr>
+        <p:blipFill>
+          <a:blip r:embed="rId14"/>
+          <a:stretch>
+            <a:fillRect/>
+          </a:stretch>
+        </p:blipFill>
+        <p:spPr>
+          <a:xfrm>
+            <a:off x="7042393" y="5021512"/>
+            <a:ext cx="1750175" cy="1312631"/>
+          </a:xfrm>
+          <a:prstGeom prst="rect">
+            <a:avLst/>
+          </a:prstGeom>
+        </p:spPr>
+      </p:pic>
+    </p:spTree>
+    <p:extLst>
+      <p:ext uri="{BB962C8B-B14F-4D97-AF65-F5344CB8AC3E}">
+        <p14:creationId xmlns:p14="http://schemas.microsoft.com/office/powerpoint/2010/main" val="2507916989"/>
+      </p:ext>
+    </p:extLst>
+  </p:cSld>
+  <p:clrMapOvr>
+    <a:masterClrMapping/>
+  </p:clrMapOvr>
+</p:sld>
+</file>
+
+<file path=ppt/slides/slide11.xml><?xml version="1.0" encoding="utf-8"?>
+<p:sld xmlns:a="http://schemas.openxmlformats.org/drawingml/2006/main" xmlns:r="http://schemas.openxmlformats.org/officeDocument/2006/relationships" xmlns:p="http://schemas.openxmlformats.org/presentationml/2006/main">
+  <p:cSld>
+    <p:spTree>
+      <p:nvGrpSpPr>
         <p:cNvPr id="1" name=""/>
         <p:cNvGrpSpPr/>
         <p:nvPr/>

</xml_diff>